<commit_message>
Added Output photos + added missing slides
</commit_message>
<xml_diff>
--- a/Documentation/PPT/Final PPT.pptx
+++ b/Documentation/PPT/Final PPT.pptx
@@ -5,7 +5,7 @@
     <p:sldMasterId id="2147483648" r:id="rId1"/>
   </p:sldMasterIdLst>
   <p:notesMasterIdLst>
-    <p:notesMasterId r:id="rId24"/>
+    <p:notesMasterId r:id="rId25"/>
   </p:notesMasterIdLst>
   <p:sldIdLst>
     <p:sldId id="256" r:id="rId2"/>
@@ -24,12 +24,13 @@
     <p:sldId id="269" r:id="rId15"/>
     <p:sldId id="270" r:id="rId16"/>
     <p:sldId id="271" r:id="rId17"/>
-    <p:sldId id="272" r:id="rId18"/>
-    <p:sldId id="273" r:id="rId19"/>
-    <p:sldId id="274" r:id="rId20"/>
-    <p:sldId id="275" r:id="rId21"/>
-    <p:sldId id="276" r:id="rId22"/>
-    <p:sldId id="277" r:id="rId23"/>
+    <p:sldId id="278" r:id="rId18"/>
+    <p:sldId id="272" r:id="rId19"/>
+    <p:sldId id="273" r:id="rId20"/>
+    <p:sldId id="274" r:id="rId21"/>
+    <p:sldId id="275" r:id="rId22"/>
+    <p:sldId id="276" r:id="rId23"/>
+    <p:sldId id="277" r:id="rId24"/>
   </p:sldIdLst>
   <p:sldSz cx="12192000" cy="6858000"/>
   <p:notesSz cx="6858000" cy="9144000"/>
@@ -128,6 +129,11 @@
       </a:defRPr>
     </a:lvl9pPr>
   </p:defaultTextStyle>
+  <p:extLst>
+    <p:ext uri="{EFAFB233-063F-42B5-8137-9DF3F51BA10A}">
+      <p15:sldGuideLst xmlns:p15="http://schemas.microsoft.com/office/powerpoint/2012/main"/>
+    </p:ext>
+  </p:extLst>
 </p:presentation>
 </file>
 
@@ -213,7 +219,7 @@
           <a:p>
             <a:fld id="{C7B7D326-E04C-425E-B562-051F10885FEC}" type="datetimeFigureOut">
               <a:rPr lang="en-IN" smtClean="0"/>
-              <a:t>12-05-2023</a:t>
+              <a:t>18-05-2023</a:t>
             </a:fld>
             <a:endParaRPr lang="en-IN"/>
           </a:p>
@@ -729,7 +735,7 @@
           <a:p>
             <a:fld id="{966FD3A5-DE35-45DF-95D7-F61816744C2F}" type="datetimeFigureOut">
               <a:rPr lang="en-IN" smtClean="0"/>
-              <a:t>12-05-2023</a:t>
+              <a:t>18-05-2023</a:t>
             </a:fld>
             <a:endParaRPr lang="en-IN"/>
           </a:p>
@@ -929,7 +935,7 @@
           <a:p>
             <a:fld id="{966FD3A5-DE35-45DF-95D7-F61816744C2F}" type="datetimeFigureOut">
               <a:rPr lang="en-IN" smtClean="0"/>
-              <a:t>12-05-2023</a:t>
+              <a:t>18-05-2023</a:t>
             </a:fld>
             <a:endParaRPr lang="en-IN"/>
           </a:p>
@@ -1139,7 +1145,7 @@
           <a:p>
             <a:fld id="{966FD3A5-DE35-45DF-95D7-F61816744C2F}" type="datetimeFigureOut">
               <a:rPr lang="en-IN" smtClean="0"/>
-              <a:t>12-05-2023</a:t>
+              <a:t>18-05-2023</a:t>
             </a:fld>
             <a:endParaRPr lang="en-IN"/>
           </a:p>
@@ -1339,7 +1345,7 @@
           <a:p>
             <a:fld id="{966FD3A5-DE35-45DF-95D7-F61816744C2F}" type="datetimeFigureOut">
               <a:rPr lang="en-IN" smtClean="0"/>
-              <a:t>12-05-2023</a:t>
+              <a:t>18-05-2023</a:t>
             </a:fld>
             <a:endParaRPr lang="en-IN"/>
           </a:p>
@@ -1615,7 +1621,7 @@
           <a:p>
             <a:fld id="{966FD3A5-DE35-45DF-95D7-F61816744C2F}" type="datetimeFigureOut">
               <a:rPr lang="en-IN" smtClean="0"/>
-              <a:t>12-05-2023</a:t>
+              <a:t>18-05-2023</a:t>
             </a:fld>
             <a:endParaRPr lang="en-IN"/>
           </a:p>
@@ -1883,7 +1889,7 @@
           <a:p>
             <a:fld id="{966FD3A5-DE35-45DF-95D7-F61816744C2F}" type="datetimeFigureOut">
               <a:rPr lang="en-IN" smtClean="0"/>
-              <a:t>12-05-2023</a:t>
+              <a:t>18-05-2023</a:t>
             </a:fld>
             <a:endParaRPr lang="en-IN"/>
           </a:p>
@@ -2298,7 +2304,7 @@
           <a:p>
             <a:fld id="{966FD3A5-DE35-45DF-95D7-F61816744C2F}" type="datetimeFigureOut">
               <a:rPr lang="en-IN" smtClean="0"/>
-              <a:t>12-05-2023</a:t>
+              <a:t>18-05-2023</a:t>
             </a:fld>
             <a:endParaRPr lang="en-IN"/>
           </a:p>
@@ -2440,7 +2446,7 @@
           <a:p>
             <a:fld id="{966FD3A5-DE35-45DF-95D7-F61816744C2F}" type="datetimeFigureOut">
               <a:rPr lang="en-IN" smtClean="0"/>
-              <a:t>12-05-2023</a:t>
+              <a:t>18-05-2023</a:t>
             </a:fld>
             <a:endParaRPr lang="en-IN"/>
           </a:p>
@@ -2553,7 +2559,7 @@
           <a:p>
             <a:fld id="{966FD3A5-DE35-45DF-95D7-F61816744C2F}" type="datetimeFigureOut">
               <a:rPr lang="en-IN" smtClean="0"/>
-              <a:t>12-05-2023</a:t>
+              <a:t>18-05-2023</a:t>
             </a:fld>
             <a:endParaRPr lang="en-IN"/>
           </a:p>
@@ -2866,7 +2872,7 @@
           <a:p>
             <a:fld id="{966FD3A5-DE35-45DF-95D7-F61816744C2F}" type="datetimeFigureOut">
               <a:rPr lang="en-IN" smtClean="0"/>
-              <a:t>12-05-2023</a:t>
+              <a:t>18-05-2023</a:t>
             </a:fld>
             <a:endParaRPr lang="en-IN"/>
           </a:p>
@@ -3155,7 +3161,7 @@
           <a:p>
             <a:fld id="{966FD3A5-DE35-45DF-95D7-F61816744C2F}" type="datetimeFigureOut">
               <a:rPr lang="en-IN" smtClean="0"/>
-              <a:t>12-05-2023</a:t>
+              <a:t>18-05-2023</a:t>
             </a:fld>
             <a:endParaRPr lang="en-IN"/>
           </a:p>
@@ -3398,7 +3404,7 @@
           <a:p>
             <a:fld id="{966FD3A5-DE35-45DF-95D7-F61816744C2F}" type="datetimeFigureOut">
               <a:rPr lang="en-IN" smtClean="0"/>
-              <a:t>12-05-2023</a:t>
+              <a:t>18-05-2023</a:t>
             </a:fld>
             <a:endParaRPr lang="en-IN"/>
           </a:p>
@@ -4619,7 +4625,7 @@
           <p:cNvPr id="2" name="Title 1">
             <a:extLst>
               <a:ext uri="{FF2B5EF4-FFF2-40B4-BE49-F238E27FC236}">
-                <a16:creationId xmlns:a16="http://schemas.microsoft.com/office/drawing/2014/main" id="{91433B79-E219-36E8-BC74-2391986A2468}"/>
+                <a16:creationId xmlns:a16="http://schemas.microsoft.com/office/drawing/2014/main" id="{48E4DF17-BBDD-C3F0-F480-65C66A08E9EB}"/>
               </a:ext>
             </a:extLst>
           </p:cNvPr>
@@ -4637,7 +4643,7 @@
           <a:p>
             <a:r>
               <a:rPr lang="en-IN" dirty="0"/>
-              <a:t>Pluto X API (MSP Protocol)</a:t>
+              <a:t>Drone Programming</a:t>
             </a:r>
           </a:p>
         </p:txBody>
@@ -4647,7 +4653,7 @@
           <p:cNvPr id="3" name="Content Placeholder 2">
             <a:extLst>
               <a:ext uri="{FF2B5EF4-FFF2-40B4-BE49-F238E27FC236}">
-                <a16:creationId xmlns:a16="http://schemas.microsoft.com/office/drawing/2014/main" id="{847F2F37-8387-5754-99C7-5B35F00B46BA}"/>
+                <a16:creationId xmlns:a16="http://schemas.microsoft.com/office/drawing/2014/main" id="{46144F92-BC8C-89F6-061F-AD5D182F466A}"/>
               </a:ext>
             </a:extLst>
           </p:cNvPr>
@@ -4665,37 +4671,7 @@
           <a:p>
             <a:r>
               <a:rPr lang="en-IN" dirty="0"/>
-              <a:t>Explain connection establish</a:t>
-            </a:r>
-          </a:p>
-          <a:p>
-            <a:r>
-              <a:rPr lang="en-IN" dirty="0"/>
-              <a:t>Packet delivery</a:t>
-            </a:r>
-          </a:p>
-          <a:p>
-            <a:r>
-              <a:rPr lang="en-IN" dirty="0"/>
-              <a:t>Packet decryption</a:t>
-            </a:r>
-          </a:p>
-          <a:p>
-            <a:r>
-              <a:rPr lang="en-IN" dirty="0"/>
-              <a:t>Response</a:t>
-            </a:r>
-          </a:p>
-          <a:p>
-            <a:r>
-              <a:rPr lang="en-IN" dirty="0"/>
-              <a:t>Working Diagram</a:t>
-            </a:r>
-          </a:p>
-          <a:p>
-            <a:r>
-              <a:rPr lang="en-IN" dirty="0"/>
-              <a:t>Output Video</a:t>
+              <a:t>Drone picture with small piece of code</a:t>
             </a:r>
           </a:p>
         </p:txBody>
@@ -4703,7 +4679,7 @@
     </p:spTree>
     <p:extLst>
       <p:ext uri="{BB962C8B-B14F-4D97-AF65-F5344CB8AC3E}">
-        <p14:creationId xmlns:p14="http://schemas.microsoft.com/office/powerpoint/2010/main" val="4228676462"/>
+        <p14:creationId xmlns:p14="http://schemas.microsoft.com/office/powerpoint/2010/main" val="4093209789"/>
       </p:ext>
     </p:extLst>
   </p:cSld>
@@ -4735,7 +4711,7 @@
           <p:cNvPr id="2" name="Title 1">
             <a:extLst>
               <a:ext uri="{FF2B5EF4-FFF2-40B4-BE49-F238E27FC236}">
-                <a16:creationId xmlns:a16="http://schemas.microsoft.com/office/drawing/2014/main" id="{038889EE-A757-CCD8-9609-A632691F458F}"/>
+                <a16:creationId xmlns:a16="http://schemas.microsoft.com/office/drawing/2014/main" id="{91433B79-E219-36E8-BC74-2391986A2468}"/>
               </a:ext>
             </a:extLst>
           </p:cNvPr>
@@ -4753,7 +4729,7 @@
           <a:p>
             <a:r>
               <a:rPr lang="en-IN" dirty="0"/>
-              <a:t>STAMP Support</a:t>
+              <a:t>Pluto X API (MSP Protocol)</a:t>
             </a:r>
           </a:p>
         </p:txBody>
@@ -4763,7 +4739,7 @@
           <p:cNvPr id="3" name="Content Placeholder 2">
             <a:extLst>
               <a:ext uri="{FF2B5EF4-FFF2-40B4-BE49-F238E27FC236}">
-                <a16:creationId xmlns:a16="http://schemas.microsoft.com/office/drawing/2014/main" id="{2F3674A0-F42F-3D94-557B-AC7240E802F8}"/>
+                <a16:creationId xmlns:a16="http://schemas.microsoft.com/office/drawing/2014/main" id="{847F2F37-8387-5754-99C7-5B35F00B46BA}"/>
               </a:ext>
             </a:extLst>
           </p:cNvPr>
@@ -4781,52 +4757,45 @@
           <a:p>
             <a:r>
               <a:rPr lang="en-IN" dirty="0"/>
-              <a:t>Explain Use case of Beach</a:t>
-            </a:r>
-          </a:p>
-          <a:p>
-            <a:r>
-              <a:rPr lang="en-IN" dirty="0"/>
-              <a:t>Show features</a:t>
-            </a:r>
-          </a:p>
-          <a:p>
-            <a:pPr lvl="1"/>
-            <a:r>
-              <a:rPr lang="en-IN" dirty="0"/>
-              <a:t>Control done remote</a:t>
-            </a:r>
-          </a:p>
-          <a:p>
-            <a:pPr lvl="1"/>
-            <a:r>
-              <a:rPr lang="en-IN" dirty="0"/>
-              <a:t>Chat</a:t>
-            </a:r>
-          </a:p>
-          <a:p>
-            <a:pPr lvl="1"/>
-            <a:r>
-              <a:rPr lang="en-IN" dirty="0" err="1"/>
-              <a:t>Dronegpt</a:t>
-            </a:r>
-            <a:endParaRPr lang="en-IN" dirty="0"/>
-          </a:p>
-          <a:p>
-            <a:r>
-              <a:rPr lang="en-IN" dirty="0"/>
-              <a:t>Output</a:t>
-            </a:r>
-          </a:p>
-          <a:p>
-            <a:endParaRPr lang="en-IN" dirty="0"/>
+              <a:t>Explain connection establish</a:t>
+            </a:r>
+          </a:p>
+          <a:p>
+            <a:r>
+              <a:rPr lang="en-IN" dirty="0"/>
+              <a:t>Packet delivery</a:t>
+            </a:r>
+          </a:p>
+          <a:p>
+            <a:r>
+              <a:rPr lang="en-IN" dirty="0"/>
+              <a:t>Packet decryption</a:t>
+            </a:r>
+          </a:p>
+          <a:p>
+            <a:r>
+              <a:rPr lang="en-IN" dirty="0"/>
+              <a:t>Response</a:t>
+            </a:r>
+          </a:p>
+          <a:p>
+            <a:r>
+              <a:rPr lang="en-IN" dirty="0"/>
+              <a:t>Working Diagram</a:t>
+            </a:r>
+          </a:p>
+          <a:p>
+            <a:r>
+              <a:rPr lang="en-IN" dirty="0"/>
+              <a:t>Output Video</a:t>
+            </a:r>
           </a:p>
         </p:txBody>
       </p:sp>
     </p:spTree>
     <p:extLst>
       <p:ext uri="{BB962C8B-B14F-4D97-AF65-F5344CB8AC3E}">
-        <p14:creationId xmlns:p14="http://schemas.microsoft.com/office/powerpoint/2010/main" val="3371949119"/>
+        <p14:creationId xmlns:p14="http://schemas.microsoft.com/office/powerpoint/2010/main" val="4228676462"/>
       </p:ext>
     </p:extLst>
   </p:cSld>
@@ -4858,7 +4827,7 @@
           <p:cNvPr id="2" name="Title 1">
             <a:extLst>
               <a:ext uri="{FF2B5EF4-FFF2-40B4-BE49-F238E27FC236}">
-                <a16:creationId xmlns:a16="http://schemas.microsoft.com/office/drawing/2014/main" id="{EA8AABDE-E857-103F-A177-DB5E04938081}"/>
+                <a16:creationId xmlns:a16="http://schemas.microsoft.com/office/drawing/2014/main" id="{038889EE-A757-CCD8-9609-A632691F458F}"/>
               </a:ext>
             </a:extLst>
           </p:cNvPr>
@@ -4876,7 +4845,7 @@
           <a:p>
             <a:r>
               <a:rPr lang="en-IN" dirty="0"/>
-              <a:t>Cloud Architecture</a:t>
+              <a:t>STAMP Support</a:t>
             </a:r>
           </a:p>
         </p:txBody>
@@ -4886,7 +4855,7 @@
           <p:cNvPr id="3" name="Content Placeholder 2">
             <a:extLst>
               <a:ext uri="{FF2B5EF4-FFF2-40B4-BE49-F238E27FC236}">
-                <a16:creationId xmlns:a16="http://schemas.microsoft.com/office/drawing/2014/main" id="{79E77500-21F0-D75D-9CAC-CD000E6BAE1D}"/>
+                <a16:creationId xmlns:a16="http://schemas.microsoft.com/office/drawing/2014/main" id="{2F3674A0-F42F-3D94-557B-AC7240E802F8}"/>
               </a:ext>
             </a:extLst>
           </p:cNvPr>
@@ -4904,43 +4873,52 @@
           <a:p>
             <a:r>
               <a:rPr lang="en-IN" dirty="0"/>
-              <a:t>Explain coupling and cohesion between components of project with cloud</a:t>
-            </a:r>
-          </a:p>
-          <a:p>
-            <a:r>
-              <a:rPr lang="en-IN" dirty="0"/>
-              <a:t>Cloud architecture diagram</a:t>
-            </a:r>
-          </a:p>
-          <a:p>
-            <a:r>
-              <a:rPr lang="en-IN" dirty="0"/>
-              <a:t>Explain s3, </a:t>
-            </a:r>
+              <a:t>Explain Use case of Beach</a:t>
+            </a:r>
+          </a:p>
+          <a:p>
+            <a:r>
+              <a:rPr lang="en-IN" dirty="0"/>
+              <a:t>Show features</a:t>
+            </a:r>
+          </a:p>
+          <a:p>
+            <a:pPr lvl="1"/>
+            <a:r>
+              <a:rPr lang="en-IN" dirty="0"/>
+              <a:t>Control done remote</a:t>
+            </a:r>
+          </a:p>
+          <a:p>
+            <a:pPr lvl="1"/>
+            <a:r>
+              <a:rPr lang="en-IN" dirty="0"/>
+              <a:t>Chat</a:t>
+            </a:r>
+          </a:p>
+          <a:p>
+            <a:pPr lvl="1"/>
             <a:r>
               <a:rPr lang="en-IN" dirty="0" err="1"/>
-              <a:t>sns</a:t>
-            </a:r>
-            <a:r>
-              <a:rPr lang="en-IN" dirty="0"/>
-              <a:t>, </a:t>
-            </a:r>
-            <a:r>
-              <a:rPr lang="en-IN" dirty="0" err="1"/>
-              <a:t>dynamodb</a:t>
-            </a:r>
-            <a:r>
-              <a:rPr lang="en-IN" dirty="0"/>
-              <a:t> </a:t>
-            </a:r>
+              <a:t>Dronegpt</a:t>
+            </a:r>
+            <a:endParaRPr lang="en-IN" dirty="0"/>
+          </a:p>
+          <a:p>
+            <a:r>
+              <a:rPr lang="en-IN" dirty="0"/>
+              <a:t>Output</a:t>
+            </a:r>
+          </a:p>
+          <a:p>
+            <a:endParaRPr lang="en-IN" dirty="0"/>
           </a:p>
         </p:txBody>
       </p:sp>
     </p:spTree>
     <p:extLst>
       <p:ext uri="{BB962C8B-B14F-4D97-AF65-F5344CB8AC3E}">
-        <p14:creationId xmlns:p14="http://schemas.microsoft.com/office/powerpoint/2010/main" val="2535699044"/>
+        <p14:creationId xmlns:p14="http://schemas.microsoft.com/office/powerpoint/2010/main" val="3371949119"/>
       </p:ext>
     </p:extLst>
   </p:cSld>
@@ -5064,7 +5042,7 @@
           <p:cNvPr id="2" name="Title 1">
             <a:extLst>
               <a:ext uri="{FF2B5EF4-FFF2-40B4-BE49-F238E27FC236}">
-                <a16:creationId xmlns:a16="http://schemas.microsoft.com/office/drawing/2014/main" id="{78F15B25-CC84-CF09-8E7E-620B4F72D3E8}"/>
+                <a16:creationId xmlns:a16="http://schemas.microsoft.com/office/drawing/2014/main" id="{EA8AABDE-E857-103F-A177-DB5E04938081}"/>
               </a:ext>
             </a:extLst>
           </p:cNvPr>
@@ -5082,7 +5060,7 @@
           <a:p>
             <a:r>
               <a:rPr lang="en-IN" dirty="0"/>
-              <a:t>Gallery</a:t>
+              <a:t>Cloud Architecture</a:t>
             </a:r>
           </a:p>
         </p:txBody>
@@ -5092,7 +5070,7 @@
           <p:cNvPr id="3" name="Content Placeholder 2">
             <a:extLst>
               <a:ext uri="{FF2B5EF4-FFF2-40B4-BE49-F238E27FC236}">
-                <a16:creationId xmlns:a16="http://schemas.microsoft.com/office/drawing/2014/main" id="{7F5A4304-EE0C-70D5-F96B-EB4A4FA33006}"/>
+                <a16:creationId xmlns:a16="http://schemas.microsoft.com/office/drawing/2014/main" id="{79E77500-21F0-D75D-9CAC-CD000E6BAE1D}"/>
               </a:ext>
             </a:extLst>
           </p:cNvPr>
@@ -5110,48 +5088,43 @@
           <a:p>
             <a:r>
               <a:rPr lang="en-IN" dirty="0"/>
-              <a:t>Show all achievements</a:t>
-            </a:r>
-          </a:p>
-          <a:p>
-            <a:r>
-              <a:rPr lang="en-IN" dirty="0"/>
-              <a:t>Share experience to show our connectivity as group with project</a:t>
-            </a:r>
-          </a:p>
-          <a:p>
-            <a:r>
-              <a:rPr lang="en-IN" dirty="0"/>
-              <a:t>Thoda </a:t>
+              <a:t>Explain coupling and cohesion between components of project with cloud</a:t>
+            </a:r>
+          </a:p>
+          <a:p>
+            <a:r>
+              <a:rPr lang="en-IN" dirty="0"/>
+              <a:t>Cloud architecture diagram</a:t>
+            </a:r>
+          </a:p>
+          <a:p>
+            <a:r>
+              <a:rPr lang="en-IN" dirty="0"/>
+              <a:t>Explain s3, </a:t>
             </a:r>
             <a:r>
               <a:rPr lang="en-IN" dirty="0" err="1"/>
-              <a:t>senti</a:t>
+              <a:t>sns</a:t>
+            </a:r>
+            <a:r>
+              <a:rPr lang="en-IN" dirty="0"/>
+              <a:t>, </a:t>
+            </a:r>
+            <a:r>
+              <a:rPr lang="en-IN" dirty="0" err="1"/>
+              <a:t>dynamodb</a:t>
             </a:r>
             <a:r>
               <a:rPr lang="en-IN" dirty="0"/>
               <a:t> </a:t>
             </a:r>
-            <a:r>
-              <a:rPr lang="en-IN" dirty="0" err="1"/>
-              <a:t>karna</a:t>
-            </a:r>
-            <a:r>
-              <a:rPr lang="en-IN" dirty="0"/>
-              <a:t> </a:t>
-            </a:r>
-            <a:r>
-              <a:rPr lang="en-IN" dirty="0" err="1"/>
-              <a:t>hai</a:t>
-            </a:r>
-            <a:endParaRPr lang="en-IN" dirty="0"/>
           </a:p>
         </p:txBody>
       </p:sp>
     </p:spTree>
     <p:extLst>
       <p:ext uri="{BB962C8B-B14F-4D97-AF65-F5344CB8AC3E}">
-        <p14:creationId xmlns:p14="http://schemas.microsoft.com/office/powerpoint/2010/main" val="277335457"/>
+        <p14:creationId xmlns:p14="http://schemas.microsoft.com/office/powerpoint/2010/main" val="2535699044"/>
       </p:ext>
     </p:extLst>
   </p:cSld>
@@ -5183,6 +5156,125 @@
           <p:cNvPr id="2" name="Title 1">
             <a:extLst>
               <a:ext uri="{FF2B5EF4-FFF2-40B4-BE49-F238E27FC236}">
+                <a16:creationId xmlns:a16="http://schemas.microsoft.com/office/drawing/2014/main" id="{78F15B25-CC84-CF09-8E7E-620B4F72D3E8}"/>
+              </a:ext>
+            </a:extLst>
+          </p:cNvPr>
+          <p:cNvSpPr>
+            <a:spLocks noGrp="1"/>
+          </p:cNvSpPr>
+          <p:nvPr>
+            <p:ph type="title"/>
+          </p:nvPr>
+        </p:nvSpPr>
+        <p:spPr/>
+        <p:txBody>
+          <a:bodyPr/>
+          <a:lstStyle/>
+          <a:p>
+            <a:r>
+              <a:rPr lang="en-IN" dirty="0"/>
+              <a:t>Gallery</a:t>
+            </a:r>
+          </a:p>
+        </p:txBody>
+      </p:sp>
+      <p:sp>
+        <p:nvSpPr>
+          <p:cNvPr id="3" name="Content Placeholder 2">
+            <a:extLst>
+              <a:ext uri="{FF2B5EF4-FFF2-40B4-BE49-F238E27FC236}">
+                <a16:creationId xmlns:a16="http://schemas.microsoft.com/office/drawing/2014/main" id="{7F5A4304-EE0C-70D5-F96B-EB4A4FA33006}"/>
+              </a:ext>
+            </a:extLst>
+          </p:cNvPr>
+          <p:cNvSpPr>
+            <a:spLocks noGrp="1"/>
+          </p:cNvSpPr>
+          <p:nvPr>
+            <p:ph idx="1"/>
+          </p:nvPr>
+        </p:nvSpPr>
+        <p:spPr/>
+        <p:txBody>
+          <a:bodyPr/>
+          <a:lstStyle/>
+          <a:p>
+            <a:r>
+              <a:rPr lang="en-IN" dirty="0"/>
+              <a:t>Show all achievements</a:t>
+            </a:r>
+          </a:p>
+          <a:p>
+            <a:r>
+              <a:rPr lang="en-IN" dirty="0"/>
+              <a:t>Share experience to show our connectivity as group with project</a:t>
+            </a:r>
+          </a:p>
+          <a:p>
+            <a:r>
+              <a:rPr lang="en-IN" dirty="0"/>
+              <a:t>Thoda </a:t>
+            </a:r>
+            <a:r>
+              <a:rPr lang="en-IN" dirty="0" err="1"/>
+              <a:t>senti</a:t>
+            </a:r>
+            <a:r>
+              <a:rPr lang="en-IN" dirty="0"/>
+              <a:t> </a:t>
+            </a:r>
+            <a:r>
+              <a:rPr lang="en-IN" dirty="0" err="1"/>
+              <a:t>karna</a:t>
+            </a:r>
+            <a:r>
+              <a:rPr lang="en-IN" dirty="0"/>
+              <a:t> </a:t>
+            </a:r>
+            <a:r>
+              <a:rPr lang="en-IN" dirty="0" err="1"/>
+              <a:t>hai</a:t>
+            </a:r>
+            <a:endParaRPr lang="en-IN" dirty="0"/>
+          </a:p>
+        </p:txBody>
+      </p:sp>
+    </p:spTree>
+    <p:extLst>
+      <p:ext uri="{BB962C8B-B14F-4D97-AF65-F5344CB8AC3E}">
+        <p14:creationId xmlns:p14="http://schemas.microsoft.com/office/powerpoint/2010/main" val="277335457"/>
+      </p:ext>
+    </p:extLst>
+  </p:cSld>
+  <p:clrMapOvr>
+    <a:masterClrMapping/>
+  </p:clrMapOvr>
+</p:sld>
+</file>
+
+<file path=ppt/slides/slide22.xml><?xml version="1.0" encoding="utf-8"?>
+<p:sld xmlns:a="http://schemas.openxmlformats.org/drawingml/2006/main" xmlns:r="http://schemas.openxmlformats.org/officeDocument/2006/relationships" xmlns:p="http://schemas.openxmlformats.org/presentationml/2006/main">
+  <p:cSld>
+    <p:spTree>
+      <p:nvGrpSpPr>
+        <p:cNvPr id="1" name=""/>
+        <p:cNvGrpSpPr/>
+        <p:nvPr/>
+      </p:nvGrpSpPr>
+      <p:grpSpPr>
+        <a:xfrm>
+          <a:off x="0" y="0"/>
+          <a:ext cx="0" cy="0"/>
+          <a:chOff x="0" y="0"/>
+          <a:chExt cx="0" cy="0"/>
+        </a:xfrm>
+      </p:grpSpPr>
+      <p:sp>
+        <p:nvSpPr>
+          <p:cNvPr id="2" name="Title 1">
+            <a:extLst>
+              <a:ext uri="{FF2B5EF4-FFF2-40B4-BE49-F238E27FC236}">
                 <a16:creationId xmlns:a16="http://schemas.microsoft.com/office/drawing/2014/main" id="{003D4911-31A9-7C48-4FFD-7DDB2F493735}"/>
               </a:ext>
             </a:extLst>
@@ -5261,7 +5353,7 @@
 </p:sld>
 </file>
 
-<file path=ppt/slides/slide22.xml><?xml version="1.0" encoding="utf-8"?>
+<file path=ppt/slides/slide23.xml><?xml version="1.0" encoding="utf-8"?>
 <p:sld xmlns:a="http://schemas.openxmlformats.org/drawingml/2006/main" xmlns:r="http://schemas.openxmlformats.org/officeDocument/2006/relationships" xmlns:p="http://schemas.openxmlformats.org/presentationml/2006/main">
   <p:cSld>
     <p:spTree>

</xml_diff>